<commit_message>
added trimap in comparison pdf to show advanctange of lap mathod
</commit_message>
<xml_diff>
--- a/002Matlab Project/project/TanResult/Laplacian Bayesian Matting Comparison.pptx
+++ b/002Matlab Project/project/TanResult/Laplacian Bayesian Matting Comparison.pptx
@@ -3208,8 +3208,8 @@
           </a:p>
         </p:txBody>
       </p:sp>
-      <mc:AlternateContent xmlns:mc="http://schemas.openxmlformats.org/markup-compatibility/2006">
-        <mc:Choice xmlns:a14="http://schemas.microsoft.com/office/drawing/2010/main" Requires="a14">
+      <mc:AlternateContent xmlns:mc="http://schemas.openxmlformats.org/markup-compatibility/2006" xmlns:a14="http://schemas.microsoft.com/office/drawing/2010/main">
+        <mc:Choice Requires="a14">
           <p:sp>
             <p:nvSpPr>
               <p:cNvPr id="9" name="文本框 8">
@@ -3418,7 +3418,7 @@
             </p:txBody>
           </p:sp>
         </mc:Choice>
-        <mc:Fallback>
+        <mc:Fallback xmlns="">
           <p:sp>
             <p:nvSpPr>
               <p:cNvPr id="9" name="文本框 8">
@@ -3463,8 +3463,8 @@
           </p:sp>
         </mc:Fallback>
       </mc:AlternateContent>
-      <mc:AlternateContent xmlns:mc="http://schemas.openxmlformats.org/markup-compatibility/2006">
-        <mc:Choice xmlns:a14="http://schemas.microsoft.com/office/drawing/2010/main" Requires="a14">
+      <mc:AlternateContent xmlns:mc="http://schemas.openxmlformats.org/markup-compatibility/2006" xmlns:a14="http://schemas.microsoft.com/office/drawing/2010/main">
+        <mc:Choice Requires="a14">
           <p:sp>
             <p:nvSpPr>
               <p:cNvPr id="11" name="文本框 10">
@@ -3623,7 +3623,7 @@
             </p:txBody>
           </p:sp>
         </mc:Choice>
-        <mc:Fallback>
+        <mc:Fallback xmlns="">
           <p:sp>
             <p:nvSpPr>
               <p:cNvPr id="11" name="文本框 10">
@@ -4246,8 +4246,8 @@
         </p:blipFill>
         <p:spPr>
           <a:xfrm>
-            <a:off x="6156325" y="1726885"/>
-            <a:ext cx="2159000" cy="2882900"/>
+            <a:off x="6898773" y="1746181"/>
+            <a:ext cx="1872519" cy="2500364"/>
           </a:xfrm>
           <a:prstGeom prst="rect">
             <a:avLst/>
@@ -4282,8 +4282,8 @@
         </p:blipFill>
         <p:spPr>
           <a:xfrm>
-            <a:off x="3492500" y="1726885"/>
-            <a:ext cx="2159000" cy="2882900"/>
+            <a:off x="4698205" y="1734705"/>
+            <a:ext cx="1868352" cy="2494800"/>
           </a:xfrm>
           <a:prstGeom prst="rect">
             <a:avLst/>
@@ -4318,8 +4318,8 @@
         </p:blipFill>
         <p:spPr>
           <a:xfrm>
-            <a:off x="828675" y="1726885"/>
-            <a:ext cx="2159000" cy="2882900"/>
+            <a:off x="288069" y="1726885"/>
+            <a:ext cx="1872519" cy="2500364"/>
           </a:xfrm>
           <a:prstGeom prst="rect">
             <a:avLst/>
@@ -4340,7 +4340,7 @@
         </p:nvSpPr>
         <p:spPr>
           <a:xfrm>
-            <a:off x="1115155" y="1357553"/>
+            <a:off x="431308" y="1376849"/>
             <a:ext cx="1586039" cy="369332"/>
           </a:xfrm>
           <a:prstGeom prst="rect">
@@ -4385,7 +4385,7 @@
         </p:nvSpPr>
         <p:spPr>
           <a:xfrm>
-            <a:off x="4040524" y="1378758"/>
+            <a:off x="5098155" y="1378052"/>
             <a:ext cx="1062951" cy="369332"/>
           </a:xfrm>
           <a:prstGeom prst="rect">
@@ -4422,7 +4422,7 @@
         </p:nvSpPr>
         <p:spPr>
           <a:xfrm>
-            <a:off x="6704349" y="1357553"/>
+            <a:off x="7303556" y="1365373"/>
             <a:ext cx="1062951" cy="369332"/>
           </a:xfrm>
           <a:prstGeom prst="rect">
@@ -4440,6 +4440,79 @@
             <a:r>
               <a:rPr kumimoji="1" lang="en-US" altLang="zh-CN" dirty="0"/>
               <a:t>Bayesian</a:t>
+            </a:r>
+            <a:endParaRPr kumimoji="1" lang="zh-CN" altLang="en-US" dirty="0"/>
+          </a:p>
+        </p:txBody>
+      </p:sp>
+      <p:pic>
+        <p:nvPicPr>
+          <p:cNvPr id="6" name="图片 5" descr="图片包含 室内, 桌子, 蛋糕, 装满&#10;&#10;描述已自动生成">
+            <a:extLst>
+              <a:ext uri="{FF2B5EF4-FFF2-40B4-BE49-F238E27FC236}">
+                <a16:creationId xmlns:a16="http://schemas.microsoft.com/office/drawing/2014/main" id="{AFCC5C8D-F9FF-785D-5CB9-027EEF121296}"/>
+              </a:ext>
+            </a:extLst>
+          </p:cNvPr>
+          <p:cNvPicPr>
+            <a:picLocks noChangeAspect="1"/>
+          </p:cNvPicPr>
+          <p:nvPr/>
+        </p:nvPicPr>
+        <p:blipFill>
+          <a:blip r:embed="rId5">
+            <a:extLst>
+              <a:ext uri="{28A0092B-C50C-407E-A947-70E740481C1C}">
+                <a14:useLocalDpi xmlns:a14="http://schemas.microsoft.com/office/drawing/2010/main" val="0"/>
+              </a:ext>
+            </a:extLst>
+          </a:blip>
+          <a:stretch>
+            <a:fillRect/>
+          </a:stretch>
+        </p:blipFill>
+        <p:spPr>
+          <a:xfrm>
+            <a:off x="2488636" y="1726884"/>
+            <a:ext cx="1872520" cy="2500365"/>
+          </a:xfrm>
+          <a:prstGeom prst="rect">
+            <a:avLst/>
+          </a:prstGeom>
+        </p:spPr>
+      </p:pic>
+      <p:sp>
+        <p:nvSpPr>
+          <p:cNvPr id="8" name="文本框 7">
+            <a:extLst>
+              <a:ext uri="{FF2B5EF4-FFF2-40B4-BE49-F238E27FC236}">
+                <a16:creationId xmlns:a16="http://schemas.microsoft.com/office/drawing/2014/main" id="{96C4D8C5-1677-9811-C71E-DDB2BD6C8076}"/>
+              </a:ext>
+            </a:extLst>
+          </p:cNvPr>
+          <p:cNvSpPr txBox="1"/>
+          <p:nvPr/>
+        </p:nvSpPr>
+        <p:spPr>
+          <a:xfrm>
+            <a:off x="2831036" y="1357552"/>
+            <a:ext cx="1062951" cy="369332"/>
+          </a:xfrm>
+          <a:prstGeom prst="rect">
+            <a:avLst/>
+          </a:prstGeom>
+          <a:noFill/>
+        </p:spPr>
+        <p:txBody>
+          <a:bodyPr wrap="square" rtlCol="0">
+            <a:spAutoFit/>
+          </a:bodyPr>
+          <a:lstStyle/>
+          <a:p>
+            <a:pPr algn="ctr"/>
+            <a:r>
+              <a:rPr kumimoji="1" lang="en-US" altLang="zh-CN" dirty="0" err="1"/>
+              <a:t>Trimap</a:t>
             </a:r>
             <a:endParaRPr kumimoji="1" lang="zh-CN" altLang="en-US" dirty="0"/>
           </a:p>
@@ -4571,7 +4644,7 @@
         </p:nvSpPr>
         <p:spPr>
           <a:xfrm>
-            <a:off x="1115155" y="1357553"/>
+            <a:off x="449798" y="1381870"/>
             <a:ext cx="1586039" cy="369332"/>
           </a:xfrm>
           <a:prstGeom prst="rect">
@@ -4616,7 +4689,7 @@
         </p:nvSpPr>
         <p:spPr>
           <a:xfrm>
-            <a:off x="4040524" y="1378758"/>
+            <a:off x="5191882" y="1413209"/>
             <a:ext cx="1062951" cy="369332"/>
           </a:xfrm>
           <a:prstGeom prst="rect">
@@ -4653,7 +4726,7 @@
         </p:nvSpPr>
         <p:spPr>
           <a:xfrm>
-            <a:off x="6704349" y="1357553"/>
+            <a:off x="7432152" y="1416321"/>
             <a:ext cx="1062951" cy="369332"/>
           </a:xfrm>
           <a:prstGeom prst="rect">
@@ -4704,8 +4777,8 @@
         </p:blipFill>
         <p:spPr>
           <a:xfrm>
-            <a:off x="621060" y="1838266"/>
-            <a:ext cx="2574227" cy="2203364"/>
+            <a:off x="250531" y="1838265"/>
+            <a:ext cx="1984575" cy="1698662"/>
           </a:xfrm>
           <a:prstGeom prst="rect">
             <a:avLst/>
@@ -4740,8 +4813,8 @@
         </p:blipFill>
         <p:spPr>
           <a:xfrm>
-            <a:off x="3284886" y="1838266"/>
-            <a:ext cx="2574227" cy="2203453"/>
+            <a:off x="4731071" y="1838197"/>
+            <a:ext cx="1984575" cy="1698730"/>
           </a:xfrm>
           <a:prstGeom prst="rect">
             <a:avLst/>
@@ -4776,14 +4849,87 @@
         </p:blipFill>
         <p:spPr>
           <a:xfrm>
-            <a:off x="5948713" y="1838266"/>
-            <a:ext cx="2574227" cy="2203454"/>
+            <a:off x="6971341" y="1838197"/>
+            <a:ext cx="1984575" cy="1698731"/>
           </a:xfrm>
           <a:prstGeom prst="rect">
             <a:avLst/>
           </a:prstGeom>
         </p:spPr>
       </p:pic>
+      <p:pic>
+        <p:nvPicPr>
+          <p:cNvPr id="7" name="图片 6" descr="卡通人物&#10;&#10;低可信度描述已自动生成">
+            <a:extLst>
+              <a:ext uri="{FF2B5EF4-FFF2-40B4-BE49-F238E27FC236}">
+                <a16:creationId xmlns:a16="http://schemas.microsoft.com/office/drawing/2014/main" id="{26EAD260-14F2-63BE-8E35-1CB215033495}"/>
+              </a:ext>
+            </a:extLst>
+          </p:cNvPr>
+          <p:cNvPicPr>
+            <a:picLocks noChangeAspect="1"/>
+          </p:cNvPicPr>
+          <p:nvPr/>
+        </p:nvPicPr>
+        <p:blipFill>
+          <a:blip r:embed="rId5">
+            <a:extLst>
+              <a:ext uri="{28A0092B-C50C-407E-A947-70E740481C1C}">
+                <a14:useLocalDpi xmlns:a14="http://schemas.microsoft.com/office/drawing/2010/main" val="0"/>
+              </a:ext>
+            </a:extLst>
+          </a:blip>
+          <a:stretch>
+            <a:fillRect/>
+          </a:stretch>
+        </p:blipFill>
+        <p:spPr>
+          <a:xfrm>
+            <a:off x="2490801" y="1838197"/>
+            <a:ext cx="1984575" cy="1698731"/>
+          </a:xfrm>
+          <a:prstGeom prst="rect">
+            <a:avLst/>
+          </a:prstGeom>
+        </p:spPr>
+      </p:pic>
+      <p:sp>
+        <p:nvSpPr>
+          <p:cNvPr id="8" name="文本框 7">
+            <a:extLst>
+              <a:ext uri="{FF2B5EF4-FFF2-40B4-BE49-F238E27FC236}">
+                <a16:creationId xmlns:a16="http://schemas.microsoft.com/office/drawing/2014/main" id="{A349788C-910C-4F0F-6ABA-B66875D42FE0}"/>
+              </a:ext>
+            </a:extLst>
+          </p:cNvPr>
+          <p:cNvSpPr txBox="1"/>
+          <p:nvPr/>
+        </p:nvSpPr>
+        <p:spPr>
+          <a:xfrm>
+            <a:off x="2951612" y="1416953"/>
+            <a:ext cx="1062951" cy="369332"/>
+          </a:xfrm>
+          <a:prstGeom prst="rect">
+            <a:avLst/>
+          </a:prstGeom>
+          <a:noFill/>
+        </p:spPr>
+        <p:txBody>
+          <a:bodyPr wrap="square" rtlCol="0">
+            <a:spAutoFit/>
+          </a:bodyPr>
+          <a:lstStyle/>
+          <a:p>
+            <a:pPr algn="ctr"/>
+            <a:r>
+              <a:rPr kumimoji="1" lang="en-US" altLang="zh-CN" dirty="0" err="1"/>
+              <a:t>Trimap</a:t>
+            </a:r>
+            <a:endParaRPr kumimoji="1" lang="zh-CN" altLang="en-US" dirty="0"/>
+          </a:p>
+        </p:txBody>
+      </p:sp>
     </p:spTree>
     <p:extLst>
       <p:ext uri="{BB962C8B-B14F-4D97-AF65-F5344CB8AC3E}">

</xml_diff>